<commit_message>
Updated first lecture slides
</commit_message>
<xml_diff>
--- a/Michigan/PUBLHLTH403/Lecture 1- Syllabus Review.pptx
+++ b/Michigan/PUBLHLTH403/Lecture 1- Syllabus Review.pptx
@@ -5,7 +5,7 @@
     <p:sldMasterId id="2147483684" r:id="rId1"/>
   </p:sldMasterIdLst>
   <p:notesMasterIdLst>
-    <p:notesMasterId r:id="rId12"/>
+    <p:notesMasterId r:id="rId17"/>
   </p:notesMasterIdLst>
   <p:sldIdLst>
     <p:sldId id="256" r:id="rId2"/>
@@ -13,11 +13,16 @@
     <p:sldId id="258" r:id="rId4"/>
     <p:sldId id="268" r:id="rId5"/>
     <p:sldId id="269" r:id="rId6"/>
-    <p:sldId id="262" r:id="rId7"/>
-    <p:sldId id="265" r:id="rId8"/>
-    <p:sldId id="266" r:id="rId9"/>
-    <p:sldId id="263" r:id="rId10"/>
-    <p:sldId id="264" r:id="rId11"/>
+    <p:sldId id="270" r:id="rId7"/>
+    <p:sldId id="271" r:id="rId8"/>
+    <p:sldId id="272" r:id="rId9"/>
+    <p:sldId id="262" r:id="rId10"/>
+    <p:sldId id="273" r:id="rId11"/>
+    <p:sldId id="265" r:id="rId12"/>
+    <p:sldId id="266" r:id="rId13"/>
+    <p:sldId id="263" r:id="rId14"/>
+    <p:sldId id="274" r:id="rId15"/>
+    <p:sldId id="264" r:id="rId16"/>
   </p:sldIdLst>
   <p:sldSz cx="12192000" cy="6858000"/>
   <p:notesSz cx="6858000" cy="9144000"/>
@@ -206,7 +211,7 @@
           <a:p>
             <a:fld id="{914DB4D6-B5D5-764E-995F-B514E2E6F6BD}" type="datetimeFigureOut">
               <a:rPr lang="en-US" smtClean="0"/>
-              <a:t>8/31/17</a:t>
+              <a:t>9/4/17</a:t>
             </a:fld>
             <a:endParaRPr lang="en-US"/>
           </a:p>
@@ -1081,7 +1086,7 @@
           <a:p>
             <a:fld id="{8A922AE3-4E1E-B14C-AFD1-28C270FC130F}" type="slidenum">
               <a:rPr lang="en-US" smtClean="0"/>
-              <a:t>9</a:t>
+              <a:t>13</a:t>
             </a:fld>
             <a:endParaRPr lang="en-US"/>
           </a:p>
@@ -1263,7 +1268,7 @@
           <a:p>
             <a:fld id="{6D3BA38C-FF8E-5942-880E-E4B9797AAFD0}" type="datetimeFigureOut">
               <a:rPr lang="en-US" smtClean="0"/>
-              <a:t>8/31/17</a:t>
+              <a:t>9/4/17</a:t>
             </a:fld>
             <a:endParaRPr lang="en-US"/>
           </a:p>
@@ -1428,7 +1433,7 @@
           <a:p>
             <a:fld id="{6D3BA38C-FF8E-5942-880E-E4B9797AAFD0}" type="datetimeFigureOut">
               <a:rPr lang="en-US" smtClean="0"/>
-              <a:t>8/31/17</a:t>
+              <a:t>9/4/17</a:t>
             </a:fld>
             <a:endParaRPr lang="en-US"/>
           </a:p>
@@ -1603,7 +1608,7 @@
           <a:p>
             <a:fld id="{6D3BA38C-FF8E-5942-880E-E4B9797AAFD0}" type="datetimeFigureOut">
               <a:rPr lang="en-US" smtClean="0"/>
-              <a:t>8/31/17</a:t>
+              <a:t>9/4/17</a:t>
             </a:fld>
             <a:endParaRPr lang="en-US"/>
           </a:p>
@@ -1768,7 +1773,7 @@
           <a:p>
             <a:fld id="{6D3BA38C-FF8E-5942-880E-E4B9797AAFD0}" type="datetimeFigureOut">
               <a:rPr lang="en-US" smtClean="0"/>
-              <a:t>8/31/17</a:t>
+              <a:t>9/4/17</a:t>
             </a:fld>
             <a:endParaRPr lang="en-US"/>
           </a:p>
@@ -2031,7 +2036,7 @@
           <a:p>
             <a:fld id="{6D3BA38C-FF8E-5942-880E-E4B9797AAFD0}" type="datetimeFigureOut">
               <a:rPr lang="en-US" smtClean="0"/>
-              <a:t>8/31/17</a:t>
+              <a:t>9/4/17</a:t>
             </a:fld>
             <a:endParaRPr lang="en-US"/>
           </a:p>
@@ -2258,7 +2263,7 @@
           <a:p>
             <a:fld id="{6D3BA38C-FF8E-5942-880E-E4B9797AAFD0}" type="datetimeFigureOut">
               <a:rPr lang="en-US" smtClean="0"/>
-              <a:t>8/31/17</a:t>
+              <a:t>9/4/17</a:t>
             </a:fld>
             <a:endParaRPr lang="en-US"/>
           </a:p>
@@ -2612,7 +2617,7 @@
           <a:p>
             <a:fld id="{6D3BA38C-FF8E-5942-880E-E4B9797AAFD0}" type="datetimeFigureOut">
               <a:rPr lang="en-US" smtClean="0"/>
-              <a:t>8/31/17</a:t>
+              <a:t>9/4/17</a:t>
             </a:fld>
             <a:endParaRPr lang="en-US"/>
           </a:p>
@@ -2748,7 +2753,7 @@
           <a:p>
             <a:fld id="{6D3BA38C-FF8E-5942-880E-E4B9797AAFD0}" type="datetimeFigureOut">
               <a:rPr lang="en-US" smtClean="0"/>
-              <a:t>8/31/17</a:t>
+              <a:t>9/4/17</a:t>
             </a:fld>
             <a:endParaRPr lang="en-US"/>
           </a:p>
@@ -2838,7 +2843,7 @@
           <a:p>
             <a:fld id="{6D3BA38C-FF8E-5942-880E-E4B9797AAFD0}" type="datetimeFigureOut">
               <a:rPr lang="en-US" smtClean="0"/>
-              <a:t>8/31/17</a:t>
+              <a:t>9/4/17</a:t>
             </a:fld>
             <a:endParaRPr lang="en-US"/>
           </a:p>
@@ -3190,7 +3195,7 @@
           <a:p>
             <a:fld id="{6D3BA38C-FF8E-5942-880E-E4B9797AAFD0}" type="datetimeFigureOut">
               <a:rPr lang="en-US" smtClean="0"/>
-              <a:t>8/31/17</a:t>
+              <a:t>9/4/17</a:t>
             </a:fld>
             <a:endParaRPr lang="en-US"/>
           </a:p>
@@ -3542,7 +3547,7 @@
           <a:p>
             <a:fld id="{6D3BA38C-FF8E-5942-880E-E4B9797AAFD0}" type="datetimeFigureOut">
               <a:rPr lang="en-US" smtClean="0"/>
-              <a:t>8/31/17</a:t>
+              <a:t>9/4/17</a:t>
             </a:fld>
             <a:endParaRPr lang="en-US"/>
           </a:p>
@@ -3778,7 +3783,7 @@
           <a:p>
             <a:fld id="{6D3BA38C-FF8E-5942-880E-E4B9797AAFD0}" type="datetimeFigureOut">
               <a:rPr lang="en-US" smtClean="0"/>
-              <a:t>8/31/17</a:t>
+              <a:t>9/4/17</a:t>
             </a:fld>
             <a:endParaRPr lang="en-US"/>
           </a:p>
@@ -4323,6 +4328,836 @@
           <a:p>
             <a:r>
               <a:rPr lang="en-US" dirty="0" smtClean="0"/>
+              <a:t>What you said you were most interested in</a:t>
+            </a:r>
+            <a:endParaRPr lang="en-US" dirty="0"/>
+          </a:p>
+        </p:txBody>
+      </p:sp>
+      <p:pic>
+        <p:nvPicPr>
+          <p:cNvPr id="4" name="Picture 3"/>
+          <p:cNvPicPr>
+            <a:picLocks noChangeAspect="1"/>
+          </p:cNvPicPr>
+          <p:nvPr/>
+        </p:nvPicPr>
+        <p:blipFill>
+          <a:blip r:embed="rId2">
+            <a:extLst>
+              <a:ext uri="{28A0092B-C50C-407E-A947-70E740481C1C}">
+                <a14:useLocalDpi xmlns:a14="http://schemas.microsoft.com/office/drawing/2010/main" val="0"/>
+              </a:ext>
+            </a:extLst>
+          </a:blip>
+          <a:stretch>
+            <a:fillRect/>
+          </a:stretch>
+        </p:blipFill>
+        <p:spPr>
+          <a:xfrm>
+            <a:off x="3225800" y="2480129"/>
+            <a:ext cx="5740400" cy="3987800"/>
+          </a:xfrm>
+          <a:prstGeom prst="rect">
+            <a:avLst/>
+          </a:prstGeom>
+        </p:spPr>
+      </p:pic>
+    </p:spTree>
+    <p:extLst>
+      <p:ext uri="{BB962C8B-B14F-4D97-AF65-F5344CB8AC3E}">
+        <p14:creationId xmlns:p14="http://schemas.microsoft.com/office/powerpoint/2010/main" val="1377184672"/>
+      </p:ext>
+    </p:extLst>
+  </p:cSld>
+  <p:clrMapOvr>
+    <a:masterClrMapping/>
+  </p:clrMapOvr>
+  <p:timing>
+    <p:tnLst>
+      <p:par>
+        <p:cTn id="1" dur="indefinite" restart="never" nodeType="tmRoot"/>
+      </p:par>
+    </p:tnLst>
+  </p:timing>
+</p:sld>
+</file>
+
+<file path=ppt/slides/slide11.xml><?xml version="1.0" encoding="utf-8"?>
+<p:sld xmlns:a="http://schemas.openxmlformats.org/drawingml/2006/main" xmlns:r="http://schemas.openxmlformats.org/officeDocument/2006/relationships" xmlns:p="http://schemas.openxmlformats.org/presentationml/2006/main">
+  <p:cSld>
+    <p:spTree>
+      <p:nvGrpSpPr>
+        <p:cNvPr id="1" name=""/>
+        <p:cNvGrpSpPr/>
+        <p:nvPr/>
+      </p:nvGrpSpPr>
+      <p:grpSpPr>
+        <a:xfrm>
+          <a:off x="0" y="0"/>
+          <a:ext cx="0" cy="0"/>
+          <a:chOff x="0" y="0"/>
+          <a:chExt cx="0" cy="0"/>
+        </a:xfrm>
+      </p:grpSpPr>
+      <p:sp>
+        <p:nvSpPr>
+          <p:cNvPr id="2" name="Title 1"/>
+          <p:cNvSpPr>
+            <a:spLocks noGrp="1"/>
+          </p:cNvSpPr>
+          <p:nvPr>
+            <p:ph type="title"/>
+          </p:nvPr>
+        </p:nvSpPr>
+        <p:spPr/>
+        <p:txBody>
+          <a:bodyPr/>
+          <a:lstStyle/>
+          <a:p>
+            <a:r>
+              <a:rPr lang="en-US" dirty="0" smtClean="0"/>
+              <a:t>Class Rules</a:t>
+            </a:r>
+            <a:endParaRPr lang="en-US" dirty="0"/>
+          </a:p>
+        </p:txBody>
+      </p:sp>
+      <p:sp>
+        <p:nvSpPr>
+          <p:cNvPr id="3" name="Content Placeholder 2"/>
+          <p:cNvSpPr>
+            <a:spLocks noGrp="1"/>
+          </p:cNvSpPr>
+          <p:nvPr>
+            <p:ph idx="1"/>
+          </p:nvPr>
+        </p:nvSpPr>
+        <p:spPr/>
+        <p:txBody>
+          <a:bodyPr>
+            <a:normAutofit/>
+          </a:bodyPr>
+          <a:lstStyle/>
+          <a:p>
+            <a:r>
+              <a:rPr lang="en-US" sz="2800" dirty="0" smtClean="0"/>
+              <a:t>No laptops, phones, tablets, </a:t>
+            </a:r>
+            <a:r>
+              <a:rPr lang="en-US" sz="2800" dirty="0" err="1" smtClean="0"/>
+              <a:t>etc</a:t>
+            </a:r>
+            <a:endParaRPr lang="en-US" sz="2800" dirty="0" smtClean="0"/>
+          </a:p>
+          <a:p>
+            <a:r>
+              <a:rPr lang="en-US" sz="2800" dirty="0" smtClean="0"/>
+              <a:t>We will provide slides beforehand</a:t>
+            </a:r>
+          </a:p>
+          <a:p>
+            <a:r>
+              <a:rPr lang="en-US" sz="2800" dirty="0" smtClean="0"/>
+              <a:t>Purchase and register an </a:t>
+            </a:r>
+            <a:r>
+              <a:rPr lang="en-US" sz="2800" dirty="0" err="1" smtClean="0"/>
+              <a:t>iClicker</a:t>
+            </a:r>
+            <a:endParaRPr lang="en-US" sz="2800" dirty="0" smtClean="0"/>
+          </a:p>
+          <a:p>
+            <a:pPr lvl="1"/>
+            <a:r>
+              <a:rPr lang="en-US" sz="2400" dirty="0" smtClean="0"/>
+              <a:t>This will be used for participation purposes but </a:t>
+            </a:r>
+            <a:r>
+              <a:rPr lang="en-US" sz="2400" b="1" u="sng" dirty="0" smtClean="0"/>
+              <a:t>not</a:t>
+            </a:r>
+            <a:r>
+              <a:rPr lang="en-US" sz="2400" b="1" dirty="0" smtClean="0"/>
+              <a:t> </a:t>
+            </a:r>
+            <a:r>
+              <a:rPr lang="en-US" sz="2400" dirty="0" smtClean="0"/>
+              <a:t>for grading</a:t>
+            </a:r>
+            <a:endParaRPr lang="en-US" sz="2400" dirty="0"/>
+          </a:p>
+        </p:txBody>
+      </p:sp>
+    </p:spTree>
+    <p:extLst>
+      <p:ext uri="{BB962C8B-B14F-4D97-AF65-F5344CB8AC3E}">
+        <p14:creationId xmlns:p14="http://schemas.microsoft.com/office/powerpoint/2010/main" val="30086143"/>
+      </p:ext>
+    </p:extLst>
+  </p:cSld>
+  <p:clrMapOvr>
+    <a:masterClrMapping/>
+  </p:clrMapOvr>
+  <p:timing>
+    <p:tnLst>
+      <p:par>
+        <p:cTn id="1" dur="indefinite" restart="never" nodeType="tmRoot">
+          <p:childTnLst>
+            <p:seq concurrent="1" nextAc="seek">
+              <p:cTn id="2" dur="indefinite" nodeType="mainSeq">
+                <p:childTnLst>
+                  <p:par>
+                    <p:cTn id="3" fill="hold">
+                      <p:stCondLst>
+                        <p:cond delay="indefinite"/>
+                      </p:stCondLst>
+                      <p:childTnLst>
+                        <p:par>
+                          <p:cTn id="4" fill="hold">
+                            <p:stCondLst>
+                              <p:cond delay="0"/>
+                            </p:stCondLst>
+                            <p:childTnLst>
+                              <p:par>
+                                <p:cTn id="5" presetID="3" presetClass="entr" presetSubtype="10" fill="hold" grpId="0" nodeType="clickEffect">
+                                  <p:stCondLst>
+                                    <p:cond delay="0"/>
+                                  </p:stCondLst>
+                                  <p:childTnLst>
+                                    <p:set>
+                                      <p:cBhvr>
+                                        <p:cTn id="6" dur="1" fill="hold">
+                                          <p:stCondLst>
+                                            <p:cond delay="0"/>
+                                          </p:stCondLst>
+                                        </p:cTn>
+                                        <p:tgtEl>
+                                          <p:spTgt spid="3">
+                                            <p:txEl>
+                                              <p:pRg st="0" end="0"/>
+                                            </p:txEl>
+                                          </p:spTgt>
+                                        </p:tgtEl>
+                                        <p:attrNameLst>
+                                          <p:attrName>style.visibility</p:attrName>
+                                        </p:attrNameLst>
+                                      </p:cBhvr>
+                                      <p:to>
+                                        <p:strVal val="visible"/>
+                                      </p:to>
+                                    </p:set>
+                                    <p:animEffect transition="in" filter="blinds(horizontal)">
+                                      <p:cBhvr>
+                                        <p:cTn id="7" dur="500"/>
+                                        <p:tgtEl>
+                                          <p:spTgt spid="3">
+                                            <p:txEl>
+                                              <p:pRg st="0" end="0"/>
+                                            </p:txEl>
+                                          </p:spTgt>
+                                        </p:tgtEl>
+                                      </p:cBhvr>
+                                    </p:animEffect>
+                                  </p:childTnLst>
+                                </p:cTn>
+                              </p:par>
+                            </p:childTnLst>
+                          </p:cTn>
+                        </p:par>
+                      </p:childTnLst>
+                    </p:cTn>
+                  </p:par>
+                  <p:par>
+                    <p:cTn id="8" fill="hold">
+                      <p:stCondLst>
+                        <p:cond delay="indefinite"/>
+                      </p:stCondLst>
+                      <p:childTnLst>
+                        <p:par>
+                          <p:cTn id="9" fill="hold">
+                            <p:stCondLst>
+                              <p:cond delay="0"/>
+                            </p:stCondLst>
+                            <p:childTnLst>
+                              <p:par>
+                                <p:cTn id="10" presetID="3" presetClass="entr" presetSubtype="10" fill="hold" grpId="0" nodeType="clickEffect">
+                                  <p:stCondLst>
+                                    <p:cond delay="0"/>
+                                  </p:stCondLst>
+                                  <p:childTnLst>
+                                    <p:set>
+                                      <p:cBhvr>
+                                        <p:cTn id="11" dur="1" fill="hold">
+                                          <p:stCondLst>
+                                            <p:cond delay="0"/>
+                                          </p:stCondLst>
+                                        </p:cTn>
+                                        <p:tgtEl>
+                                          <p:spTgt spid="3">
+                                            <p:txEl>
+                                              <p:pRg st="1" end="1"/>
+                                            </p:txEl>
+                                          </p:spTgt>
+                                        </p:tgtEl>
+                                        <p:attrNameLst>
+                                          <p:attrName>style.visibility</p:attrName>
+                                        </p:attrNameLst>
+                                      </p:cBhvr>
+                                      <p:to>
+                                        <p:strVal val="visible"/>
+                                      </p:to>
+                                    </p:set>
+                                    <p:animEffect transition="in" filter="blinds(horizontal)">
+                                      <p:cBhvr>
+                                        <p:cTn id="12" dur="500"/>
+                                        <p:tgtEl>
+                                          <p:spTgt spid="3">
+                                            <p:txEl>
+                                              <p:pRg st="1" end="1"/>
+                                            </p:txEl>
+                                          </p:spTgt>
+                                        </p:tgtEl>
+                                      </p:cBhvr>
+                                    </p:animEffect>
+                                  </p:childTnLst>
+                                </p:cTn>
+                              </p:par>
+                            </p:childTnLst>
+                          </p:cTn>
+                        </p:par>
+                      </p:childTnLst>
+                    </p:cTn>
+                  </p:par>
+                  <p:par>
+                    <p:cTn id="13" fill="hold">
+                      <p:stCondLst>
+                        <p:cond delay="indefinite"/>
+                      </p:stCondLst>
+                      <p:childTnLst>
+                        <p:par>
+                          <p:cTn id="14" fill="hold">
+                            <p:stCondLst>
+                              <p:cond delay="0"/>
+                            </p:stCondLst>
+                            <p:childTnLst>
+                              <p:par>
+                                <p:cTn id="15" presetID="3" presetClass="entr" presetSubtype="10" fill="hold" grpId="0" nodeType="clickEffect">
+                                  <p:stCondLst>
+                                    <p:cond delay="0"/>
+                                  </p:stCondLst>
+                                  <p:childTnLst>
+                                    <p:set>
+                                      <p:cBhvr>
+                                        <p:cTn id="16" dur="1" fill="hold">
+                                          <p:stCondLst>
+                                            <p:cond delay="0"/>
+                                          </p:stCondLst>
+                                        </p:cTn>
+                                        <p:tgtEl>
+                                          <p:spTgt spid="3">
+                                            <p:txEl>
+                                              <p:pRg st="2" end="2"/>
+                                            </p:txEl>
+                                          </p:spTgt>
+                                        </p:tgtEl>
+                                        <p:attrNameLst>
+                                          <p:attrName>style.visibility</p:attrName>
+                                        </p:attrNameLst>
+                                      </p:cBhvr>
+                                      <p:to>
+                                        <p:strVal val="visible"/>
+                                      </p:to>
+                                    </p:set>
+                                    <p:animEffect transition="in" filter="blinds(horizontal)">
+                                      <p:cBhvr>
+                                        <p:cTn id="17" dur="500"/>
+                                        <p:tgtEl>
+                                          <p:spTgt spid="3">
+                                            <p:txEl>
+                                              <p:pRg st="2" end="2"/>
+                                            </p:txEl>
+                                          </p:spTgt>
+                                        </p:tgtEl>
+                                      </p:cBhvr>
+                                    </p:animEffect>
+                                  </p:childTnLst>
+                                </p:cTn>
+                              </p:par>
+                              <p:par>
+                                <p:cTn id="18" presetID="3" presetClass="entr" presetSubtype="10" fill="hold" grpId="0" nodeType="withEffect">
+                                  <p:stCondLst>
+                                    <p:cond delay="0"/>
+                                  </p:stCondLst>
+                                  <p:childTnLst>
+                                    <p:set>
+                                      <p:cBhvr>
+                                        <p:cTn id="19" dur="1" fill="hold">
+                                          <p:stCondLst>
+                                            <p:cond delay="0"/>
+                                          </p:stCondLst>
+                                        </p:cTn>
+                                        <p:tgtEl>
+                                          <p:spTgt spid="3">
+                                            <p:txEl>
+                                              <p:pRg st="3" end="3"/>
+                                            </p:txEl>
+                                          </p:spTgt>
+                                        </p:tgtEl>
+                                        <p:attrNameLst>
+                                          <p:attrName>style.visibility</p:attrName>
+                                        </p:attrNameLst>
+                                      </p:cBhvr>
+                                      <p:to>
+                                        <p:strVal val="visible"/>
+                                      </p:to>
+                                    </p:set>
+                                    <p:animEffect transition="in" filter="blinds(horizontal)">
+                                      <p:cBhvr>
+                                        <p:cTn id="20" dur="500"/>
+                                        <p:tgtEl>
+                                          <p:spTgt spid="3">
+                                            <p:txEl>
+                                              <p:pRg st="3" end="3"/>
+                                            </p:txEl>
+                                          </p:spTgt>
+                                        </p:tgtEl>
+                                      </p:cBhvr>
+                                    </p:animEffect>
+                                  </p:childTnLst>
+                                </p:cTn>
+                              </p:par>
+                            </p:childTnLst>
+                          </p:cTn>
+                        </p:par>
+                      </p:childTnLst>
+                    </p:cTn>
+                  </p:par>
+                </p:childTnLst>
+              </p:cTn>
+              <p:prevCondLst>
+                <p:cond evt="onPrev" delay="0">
+                  <p:tgtEl>
+                    <p:sldTgt/>
+                  </p:tgtEl>
+                </p:cond>
+              </p:prevCondLst>
+              <p:nextCondLst>
+                <p:cond evt="onNext" delay="0">
+                  <p:tgtEl>
+                    <p:sldTgt/>
+                  </p:tgtEl>
+                </p:cond>
+              </p:nextCondLst>
+            </p:seq>
+          </p:childTnLst>
+        </p:cTn>
+      </p:par>
+    </p:tnLst>
+    <p:bldLst>
+      <p:bldP spid="3" grpId="0" build="p"/>
+    </p:bldLst>
+  </p:timing>
+</p:sld>
+</file>
+
+<file path=ppt/slides/slide12.xml><?xml version="1.0" encoding="utf-8"?>
+<p:sld xmlns:a="http://schemas.openxmlformats.org/drawingml/2006/main" xmlns:r="http://schemas.openxmlformats.org/officeDocument/2006/relationships" xmlns:p="http://schemas.openxmlformats.org/presentationml/2006/main">
+  <p:cSld>
+    <p:spTree>
+      <p:nvGrpSpPr>
+        <p:cNvPr id="1" name=""/>
+        <p:cNvGrpSpPr/>
+        <p:nvPr/>
+      </p:nvGrpSpPr>
+      <p:grpSpPr>
+        <a:xfrm>
+          <a:off x="0" y="0"/>
+          <a:ext cx="0" cy="0"/>
+          <a:chOff x="0" y="0"/>
+          <a:chExt cx="0" cy="0"/>
+        </a:xfrm>
+      </p:grpSpPr>
+      <p:sp>
+        <p:nvSpPr>
+          <p:cNvPr id="2" name="Title 1"/>
+          <p:cNvSpPr>
+            <a:spLocks noGrp="1"/>
+          </p:cNvSpPr>
+          <p:nvPr>
+            <p:ph type="title"/>
+          </p:nvPr>
+        </p:nvSpPr>
+        <p:spPr/>
+        <p:txBody>
+          <a:bodyPr/>
+          <a:lstStyle/>
+          <a:p>
+            <a:r>
+              <a:rPr lang="en-US" dirty="0" smtClean="0"/>
+              <a:t>What is the best hockey team in the world?</a:t>
+            </a:r>
+            <a:endParaRPr lang="en-US" dirty="0"/>
+          </a:p>
+        </p:txBody>
+      </p:sp>
+      <p:sp>
+        <p:nvSpPr>
+          <p:cNvPr id="3" name="Content Placeholder 2"/>
+          <p:cNvSpPr>
+            <a:spLocks noGrp="1"/>
+          </p:cNvSpPr>
+          <p:nvPr>
+            <p:ph idx="1"/>
+          </p:nvPr>
+        </p:nvSpPr>
+        <p:spPr/>
+        <p:txBody>
+          <a:bodyPr/>
+          <a:lstStyle/>
+          <a:p>
+            <a:pPr marL="342900" indent="-342900">
+              <a:buFont typeface="+mj-lt"/>
+              <a:buAutoNum type="alphaUcPeriod"/>
+            </a:pPr>
+            <a:r>
+              <a:rPr lang="en-US" dirty="0" smtClean="0"/>
+              <a:t>Detroit Red Wings</a:t>
+            </a:r>
+          </a:p>
+          <a:p>
+            <a:pPr marL="342900" indent="-342900">
+              <a:buFont typeface="+mj-lt"/>
+              <a:buAutoNum type="alphaUcPeriod"/>
+            </a:pPr>
+            <a:r>
+              <a:rPr lang="en-US" dirty="0" smtClean="0"/>
+              <a:t>Toronto Maple Leafs</a:t>
+            </a:r>
+          </a:p>
+          <a:p>
+            <a:pPr marL="342900" indent="-342900">
+              <a:buFont typeface="+mj-lt"/>
+              <a:buAutoNum type="alphaUcPeriod"/>
+            </a:pPr>
+            <a:r>
+              <a:rPr lang="en-US" dirty="0" smtClean="0"/>
+              <a:t>Montreal </a:t>
+            </a:r>
+            <a:r>
+              <a:rPr lang="en-US" dirty="0" err="1" smtClean="0"/>
+              <a:t>Canadiens</a:t>
+            </a:r>
+            <a:endParaRPr lang="en-US" dirty="0" smtClean="0"/>
+          </a:p>
+          <a:p>
+            <a:pPr marL="342900" indent="-342900">
+              <a:buFont typeface="+mj-lt"/>
+              <a:buAutoNum type="alphaUcPeriod"/>
+            </a:pPr>
+            <a:r>
+              <a:rPr lang="en-US" dirty="0" smtClean="0"/>
+              <a:t>Pittsburgh Penguins</a:t>
+            </a:r>
+            <a:endParaRPr lang="en-US" dirty="0"/>
+          </a:p>
+        </p:txBody>
+      </p:sp>
+    </p:spTree>
+    <p:extLst>
+      <p:ext uri="{BB962C8B-B14F-4D97-AF65-F5344CB8AC3E}">
+        <p14:creationId xmlns:p14="http://schemas.microsoft.com/office/powerpoint/2010/main" val="1087297385"/>
+      </p:ext>
+    </p:extLst>
+  </p:cSld>
+  <p:clrMapOvr>
+    <a:masterClrMapping/>
+  </p:clrMapOvr>
+  <p:timing>
+    <p:tnLst>
+      <p:par>
+        <p:cTn id="1" dur="indefinite" restart="never" nodeType="tmRoot"/>
+      </p:par>
+    </p:tnLst>
+  </p:timing>
+</p:sld>
+</file>
+
+<file path=ppt/slides/slide13.xml><?xml version="1.0" encoding="utf-8"?>
+<p:sld xmlns:a="http://schemas.openxmlformats.org/drawingml/2006/main" xmlns:r="http://schemas.openxmlformats.org/officeDocument/2006/relationships" xmlns:p="http://schemas.openxmlformats.org/presentationml/2006/main">
+  <p:cSld>
+    <p:spTree>
+      <p:nvGrpSpPr>
+        <p:cNvPr id="1" name=""/>
+        <p:cNvGrpSpPr/>
+        <p:nvPr/>
+      </p:nvGrpSpPr>
+      <p:grpSpPr>
+        <a:xfrm>
+          <a:off x="0" y="0"/>
+          <a:ext cx="0" cy="0"/>
+          <a:chOff x="0" y="0"/>
+          <a:chExt cx="0" cy="0"/>
+        </a:xfrm>
+      </p:grpSpPr>
+      <p:sp>
+        <p:nvSpPr>
+          <p:cNvPr id="2" name="Title 1"/>
+          <p:cNvSpPr>
+            <a:spLocks noGrp="1"/>
+          </p:cNvSpPr>
+          <p:nvPr>
+            <p:ph type="title"/>
+          </p:nvPr>
+        </p:nvSpPr>
+        <p:spPr/>
+        <p:txBody>
+          <a:bodyPr/>
+          <a:lstStyle/>
+          <a:p>
+            <a:r>
+              <a:rPr lang="en-US" dirty="0" smtClean="0"/>
+              <a:t>Class Format</a:t>
+            </a:r>
+            <a:endParaRPr lang="en-US" dirty="0"/>
+          </a:p>
+        </p:txBody>
+      </p:sp>
+      <p:sp>
+        <p:nvSpPr>
+          <p:cNvPr id="3" name="Content Placeholder 2"/>
+          <p:cNvSpPr>
+            <a:spLocks noGrp="1"/>
+          </p:cNvSpPr>
+          <p:nvPr>
+            <p:ph idx="1"/>
+          </p:nvPr>
+        </p:nvSpPr>
+        <p:spPr/>
+        <p:txBody>
+          <a:bodyPr>
+            <a:normAutofit/>
+          </a:bodyPr>
+          <a:lstStyle/>
+          <a:p>
+            <a:r>
+              <a:rPr lang="en-US" sz="2400" dirty="0" smtClean="0"/>
+              <a:t>2 Lectures per week, often one by me and one by Dr. Bauer</a:t>
+            </a:r>
+          </a:p>
+          <a:p>
+            <a:r>
+              <a:rPr lang="en-US" sz="2400" dirty="0" smtClean="0"/>
+              <a:t>1 Discussion section per week</a:t>
+            </a:r>
+          </a:p>
+          <a:p>
+            <a:pPr lvl="1"/>
+            <a:r>
+              <a:rPr lang="en-US" sz="2000" dirty="0" smtClean="0"/>
+              <a:t>Readings </a:t>
+            </a:r>
+            <a:r>
+              <a:rPr lang="en-US" sz="2000" dirty="0" smtClean="0"/>
+              <a:t>are posted, read them </a:t>
+            </a:r>
+            <a:r>
+              <a:rPr lang="en-US" sz="2000" b="1" u="sng" dirty="0" smtClean="0"/>
+              <a:t>before</a:t>
+            </a:r>
+            <a:r>
+              <a:rPr lang="en-US" sz="2000" b="1" dirty="0" smtClean="0"/>
+              <a:t> </a:t>
+            </a:r>
+            <a:r>
+              <a:rPr lang="en-US" sz="2000" dirty="0" smtClean="0"/>
+              <a:t>the discussion</a:t>
+            </a:r>
+            <a:endParaRPr lang="en-US" sz="2000" dirty="0"/>
+          </a:p>
+        </p:txBody>
+      </p:sp>
+    </p:spTree>
+    <p:extLst>
+      <p:ext uri="{BB962C8B-B14F-4D97-AF65-F5344CB8AC3E}">
+        <p14:creationId xmlns:p14="http://schemas.microsoft.com/office/powerpoint/2010/main" val="2084624364"/>
+      </p:ext>
+    </p:extLst>
+  </p:cSld>
+  <p:clrMapOvr>
+    <a:masterClrMapping/>
+  </p:clrMapOvr>
+  <p:timing>
+    <p:tnLst>
+      <p:par>
+        <p:cTn id="1" dur="indefinite" restart="never" nodeType="tmRoot"/>
+      </p:par>
+    </p:tnLst>
+  </p:timing>
+</p:sld>
+</file>
+
+<file path=ppt/slides/slide14.xml><?xml version="1.0" encoding="utf-8"?>
+<p:sld xmlns:a="http://schemas.openxmlformats.org/drawingml/2006/main" xmlns:r="http://schemas.openxmlformats.org/officeDocument/2006/relationships" xmlns:p="http://schemas.openxmlformats.org/presentationml/2006/main">
+  <p:cSld>
+    <p:spTree>
+      <p:nvGrpSpPr>
+        <p:cNvPr id="1" name=""/>
+        <p:cNvGrpSpPr/>
+        <p:nvPr/>
+      </p:nvGrpSpPr>
+      <p:grpSpPr>
+        <a:xfrm>
+          <a:off x="0" y="0"/>
+          <a:ext cx="0" cy="0"/>
+          <a:chOff x="0" y="0"/>
+          <a:chExt cx="0" cy="0"/>
+        </a:xfrm>
+      </p:grpSpPr>
+      <p:sp>
+        <p:nvSpPr>
+          <p:cNvPr id="2" name="Title 1"/>
+          <p:cNvSpPr>
+            <a:spLocks noGrp="1"/>
+          </p:cNvSpPr>
+          <p:nvPr>
+            <p:ph type="title"/>
+          </p:nvPr>
+        </p:nvSpPr>
+        <p:spPr/>
+        <p:txBody>
+          <a:bodyPr/>
+          <a:lstStyle/>
+          <a:p>
+            <a:r>
+              <a:rPr lang="en-US" dirty="0" smtClean="0"/>
+              <a:t>This Week’s Discussion</a:t>
+            </a:r>
+            <a:endParaRPr lang="en-US" dirty="0"/>
+          </a:p>
+        </p:txBody>
+      </p:sp>
+      <p:sp>
+        <p:nvSpPr>
+          <p:cNvPr id="3" name="Content Placeholder 2"/>
+          <p:cNvSpPr>
+            <a:spLocks noGrp="1"/>
+          </p:cNvSpPr>
+          <p:nvPr>
+            <p:ph idx="1"/>
+          </p:nvPr>
+        </p:nvSpPr>
+        <p:spPr/>
+        <p:txBody>
+          <a:bodyPr/>
+          <a:lstStyle/>
+          <a:p>
+            <a:r>
+              <a:rPr lang="en-US" dirty="0" smtClean="0"/>
+              <a:t>Demonstration of methods for determining body composition</a:t>
+            </a:r>
+          </a:p>
+          <a:p>
+            <a:pPr lvl="1"/>
+            <a:r>
+              <a:rPr lang="en-US" dirty="0" smtClean="0"/>
+              <a:t>Read the posted materials before the demonstration</a:t>
+            </a:r>
+          </a:p>
+          <a:p>
+            <a:r>
+              <a:rPr lang="en-US" dirty="0" smtClean="0"/>
+              <a:t>Will meet at the MCRU in the Cardiovascular Center (directions will be posted on Canvas)</a:t>
+            </a:r>
+          </a:p>
+          <a:p>
+            <a:r>
+              <a:rPr lang="en-US" dirty="0" smtClean="0"/>
+              <a:t>If you would like to participate (</a:t>
+            </a:r>
+            <a:r>
+              <a:rPr lang="en-US" i="1" dirty="0" smtClean="0"/>
+              <a:t>i.e. </a:t>
+            </a:r>
+            <a:r>
+              <a:rPr lang="en-US" dirty="0" smtClean="0"/>
+              <a:t>be assessed) please email me (</a:t>
+            </a:r>
+            <a:r>
+              <a:rPr lang="en-US" dirty="0" err="1" smtClean="0"/>
+              <a:t>davebrid@umich.edu</a:t>
+            </a:r>
+            <a:r>
+              <a:rPr lang="en-US" dirty="0" smtClean="0"/>
+              <a:t>) by </a:t>
+            </a:r>
+            <a:r>
+              <a:rPr lang="en-US" b="1" dirty="0" smtClean="0"/>
+              <a:t>Noon</a:t>
+            </a:r>
+            <a:r>
+              <a:rPr lang="en-US" dirty="0" smtClean="0"/>
+              <a:t> on Wednesday</a:t>
+            </a:r>
+            <a:endParaRPr lang="en-US" dirty="0"/>
+          </a:p>
+        </p:txBody>
+      </p:sp>
+    </p:spTree>
+    <p:extLst>
+      <p:ext uri="{BB962C8B-B14F-4D97-AF65-F5344CB8AC3E}">
+        <p14:creationId xmlns:p14="http://schemas.microsoft.com/office/powerpoint/2010/main" val="1077213916"/>
+      </p:ext>
+    </p:extLst>
+  </p:cSld>
+  <p:clrMapOvr>
+    <a:masterClrMapping/>
+  </p:clrMapOvr>
+  <p:timing>
+    <p:tnLst>
+      <p:par>
+        <p:cTn id="1" dur="indefinite" restart="never" nodeType="tmRoot"/>
+      </p:par>
+    </p:tnLst>
+  </p:timing>
+</p:sld>
+</file>
+
+<file path=ppt/slides/slide15.xml><?xml version="1.0" encoding="utf-8"?>
+<p:sld xmlns:a="http://schemas.openxmlformats.org/drawingml/2006/main" xmlns:r="http://schemas.openxmlformats.org/officeDocument/2006/relationships" xmlns:p="http://schemas.openxmlformats.org/presentationml/2006/main">
+  <p:cSld>
+    <p:spTree>
+      <p:nvGrpSpPr>
+        <p:cNvPr id="1" name=""/>
+        <p:cNvGrpSpPr/>
+        <p:nvPr/>
+      </p:nvGrpSpPr>
+      <p:grpSpPr>
+        <a:xfrm>
+          <a:off x="0" y="0"/>
+          <a:ext cx="0" cy="0"/>
+          <a:chOff x="0" y="0"/>
+          <a:chExt cx="0" cy="0"/>
+        </a:xfrm>
+      </p:grpSpPr>
+      <p:sp>
+        <p:nvSpPr>
+          <p:cNvPr id="2" name="Title 1"/>
+          <p:cNvSpPr>
+            <a:spLocks noGrp="1"/>
+          </p:cNvSpPr>
+          <p:nvPr>
+            <p:ph type="title"/>
+          </p:nvPr>
+        </p:nvSpPr>
+        <p:spPr/>
+        <p:txBody>
+          <a:bodyPr/>
+          <a:lstStyle/>
+          <a:p>
+            <a:r>
+              <a:rPr lang="en-US" dirty="0" smtClean="0"/>
               <a:t>How will you be assessed</a:t>
             </a:r>
             <a:endParaRPr lang="en-US" dirty="0"/>
@@ -4819,29 +5654,66 @@
           </a:p>
         </p:txBody>
       </p:sp>
-      <p:sp>
-        <p:nvSpPr>
-          <p:cNvPr id="3" name="Content Placeholder 2"/>
-          <p:cNvSpPr>
-            <a:spLocks noGrp="1"/>
-          </p:cNvSpPr>
-          <p:nvPr>
-            <p:ph idx="1"/>
-          </p:nvPr>
-        </p:nvSpPr>
-        <p:spPr/>
-        <p:txBody>
-          <a:bodyPr/>
-          <a:lstStyle/>
-          <a:p>
-            <a:r>
-              <a:rPr lang="en-US" dirty="0" smtClean="0"/>
-              <a:t>Will update with results of student survey</a:t>
-            </a:r>
-            <a:endParaRPr lang="en-US" dirty="0"/>
-          </a:p>
-        </p:txBody>
-      </p:sp>
+      <p:pic>
+        <p:nvPicPr>
+          <p:cNvPr id="5" name="Picture 4"/>
+          <p:cNvPicPr>
+            <a:picLocks noChangeAspect="1"/>
+          </p:cNvPicPr>
+          <p:nvPr/>
+        </p:nvPicPr>
+        <p:blipFill>
+          <a:blip r:embed="rId3">
+            <a:extLst>
+              <a:ext uri="{28A0092B-C50C-407E-A947-70E740481C1C}">
+                <a14:useLocalDpi xmlns:a14="http://schemas.microsoft.com/office/drawing/2010/main" val="0"/>
+              </a:ext>
+            </a:extLst>
+          </a:blip>
+          <a:stretch>
+            <a:fillRect/>
+          </a:stretch>
+        </p:blipFill>
+        <p:spPr>
+          <a:xfrm>
+            <a:off x="392881" y="2557616"/>
+            <a:ext cx="5346700" cy="3263900"/>
+          </a:xfrm>
+          <a:prstGeom prst="rect">
+            <a:avLst/>
+          </a:prstGeom>
+        </p:spPr>
+      </p:pic>
+      <p:pic>
+        <p:nvPicPr>
+          <p:cNvPr id="6" name="Picture 5"/>
+          <p:cNvPicPr>
+            <a:picLocks noChangeAspect="1"/>
+          </p:cNvPicPr>
+          <p:nvPr/>
+        </p:nvPicPr>
+        <p:blipFill>
+          <a:blip r:embed="rId4">
+            <a:extLst>
+              <a:ext uri="{28A0092B-C50C-407E-A947-70E740481C1C}">
+                <a14:useLocalDpi xmlns:a14="http://schemas.microsoft.com/office/drawing/2010/main" val="0"/>
+              </a:ext>
+            </a:extLst>
+          </a:blip>
+          <a:stretch>
+            <a:fillRect/>
+          </a:stretch>
+        </p:blipFill>
+        <p:spPr>
+          <a:xfrm>
+            <a:off x="6096000" y="2557616"/>
+            <a:ext cx="5486400" cy="3695700"/>
+          </a:xfrm>
+          <a:prstGeom prst="rect">
+            <a:avLst/>
+          </a:prstGeom>
+        </p:spPr>
+      </p:pic>
     </p:spTree>
     <p:extLst>
       <p:ext uri="{BB962C8B-B14F-4D97-AF65-F5344CB8AC3E}">
@@ -4855,7 +5727,83 @@
   <p:timing>
     <p:tnLst>
       <p:par>
-        <p:cTn id="1" dur="indefinite" restart="never" nodeType="tmRoot"/>
+        <p:cTn id="1" dur="indefinite" restart="never" nodeType="tmRoot">
+          <p:childTnLst>
+            <p:seq concurrent="1" nextAc="seek">
+              <p:cTn id="2" dur="indefinite" nodeType="mainSeq">
+                <p:childTnLst>
+                  <p:par>
+                    <p:cTn id="3" fill="hold">
+                      <p:stCondLst>
+                        <p:cond delay="indefinite"/>
+                      </p:stCondLst>
+                      <p:childTnLst>
+                        <p:par>
+                          <p:cTn id="4" fill="hold">
+                            <p:stCondLst>
+                              <p:cond delay="0"/>
+                            </p:stCondLst>
+                            <p:childTnLst>
+                              <p:par>
+                                <p:cTn id="5" presetID="3" presetClass="entr" presetSubtype="10" fill="hold" nodeType="clickEffect">
+                                  <p:stCondLst>
+                                    <p:cond delay="0"/>
+                                  </p:stCondLst>
+                                  <p:childTnLst>
+                                    <p:set>
+                                      <p:cBhvr>
+                                        <p:cTn id="6" dur="1" fill="hold">
+                                          <p:stCondLst>
+                                            <p:cond delay="0"/>
+                                          </p:stCondLst>
+                                        </p:cTn>
+                                        <p:tgtEl>
+                                          <p:spTgt spid="6"/>
+                                        </p:tgtEl>
+                                        <p:attrNameLst>
+                                          <p:attrName>style.visibility</p:attrName>
+                                        </p:attrNameLst>
+                                      </p:cBhvr>
+                                      <p:to>
+                                        <p:strVal val="visible"/>
+                                      </p:to>
+                                    </p:set>
+                                    <p:animEffect transition="in" filter="blinds(horizontal)">
+                                      <p:cBhvr>
+                                        <p:cTn id="7" dur="500"/>
+                                        <p:tgtEl>
+                                          <p:spTgt spid="6"/>
+                                        </p:tgtEl>
+                                      </p:cBhvr>
+                                    </p:animEffect>
+                                  </p:childTnLst>
+                                </p:cTn>
+                              </p:par>
+                            </p:childTnLst>
+                          </p:cTn>
+                        </p:par>
+                      </p:childTnLst>
+                    </p:cTn>
+                  </p:par>
+                </p:childTnLst>
+              </p:cTn>
+              <p:prevCondLst>
+                <p:cond evt="onPrev" delay="0">
+                  <p:tgtEl>
+                    <p:sldTgt/>
+                  </p:tgtEl>
+                </p:cond>
+              </p:prevCondLst>
+              <p:nextCondLst>
+                <p:cond evt="onNext" delay="0">
+                  <p:tgtEl>
+                    <p:sldTgt/>
+                  </p:tgtEl>
+                </p:cond>
+              </p:nextCondLst>
+            </p:seq>
+          </p:childTnLst>
+        </p:cTn>
       </p:par>
     </p:tnLst>
   </p:timing>
@@ -5033,6 +5981,13 @@
   <p:clrMapOvr>
     <a:masterClrMapping/>
   </p:clrMapOvr>
+  <p:timing>
+    <p:tnLst>
+      <p:par>
+        <p:cTn id="1" dur="indefinite" restart="never" nodeType="tmRoot"/>
+      </p:par>
+    </p:tnLst>
+  </p:timing>
 </p:sld>
 </file>
 
@@ -5134,7 +6089,7 @@
               <a:buSzPct val="25000"/>
             </a:pPr>
             <a:r>
-              <a:rPr lang="en" cap="none">
+              <a:rPr lang="en" sz="2400" cap="none" dirty="0">
                 <a:latin typeface="Cabin"/>
                 <a:ea typeface="Cabin"/>
                 <a:cs typeface="Cabin"/>
@@ -5174,12 +6129,175 @@
               <a:spcBef>
                 <a:spcPts val="0"/>
               </a:spcBef>
+              <a:spcAft>
+                <a:spcPts val="600"/>
+              </a:spcAft>
+            </a:pPr>
+            <a:r>
+              <a:rPr lang="en" sz="2400" dirty="0"/>
+              <a:t>Obesity </a:t>
+            </a:r>
+            <a:r>
+              <a:rPr lang="en-US" sz="2400" dirty="0" smtClean="0"/>
+              <a:t>can be</a:t>
+            </a:r>
+            <a:r>
+              <a:rPr lang="en" sz="2400" dirty="0" smtClean="0"/>
+              <a:t> </a:t>
+            </a:r>
+            <a:r>
+              <a:rPr lang="en" sz="2400" dirty="0"/>
+              <a:t>hard to talk about.</a:t>
+            </a:r>
+          </a:p>
+          <a:p>
+            <a:pPr lvl="1">
+              <a:spcBef>
+                <a:spcPts val="0"/>
+              </a:spcBef>
+              <a:spcAft>
+                <a:spcPts val="600"/>
+              </a:spcAft>
+            </a:pPr>
+            <a:r>
+              <a:rPr lang="en" sz="1800" dirty="0"/>
+              <a:t>Words and perspectives that don’t bother one person, may bother another.</a:t>
+            </a:r>
+          </a:p>
+          <a:p>
+            <a:pPr>
+              <a:spcBef>
+                <a:spcPts val="0"/>
+              </a:spcBef>
+              <a:spcAft>
+                <a:spcPts val="600"/>
+              </a:spcAft>
+            </a:pPr>
+            <a:r>
+              <a:rPr lang="en" sz="2400" dirty="0"/>
+              <a:t>We expect everyone in this course to come from a place of empathy and consideration.</a:t>
+            </a:r>
+            <a:r>
+              <a:rPr lang="en" sz="2000" dirty="0"/>
+              <a:t>	</a:t>
+            </a:r>
+          </a:p>
+          <a:p>
+            <a:pPr lvl="1">
+              <a:spcBef>
+                <a:spcPts val="0"/>
+              </a:spcBef>
+              <a:spcAft>
+                <a:spcPts val="600"/>
+              </a:spcAft>
+            </a:pPr>
+            <a:r>
+              <a:rPr lang="en" sz="1800" dirty="0" smtClean="0"/>
+              <a:t>We </a:t>
+            </a:r>
+            <a:r>
+              <a:rPr lang="en" sz="1800" dirty="0"/>
+              <a:t>won’t all be perfect all the time.</a:t>
+            </a:r>
+          </a:p>
+          <a:p>
+            <a:pPr>
+              <a:spcBef>
+                <a:spcPts val="0"/>
+              </a:spcBef>
+              <a:spcAft>
+                <a:spcPts val="600"/>
+              </a:spcAft>
+            </a:pPr>
+            <a:r>
+              <a:rPr lang="en" sz="2400" dirty="0"/>
+              <a:t>We will try to model for you sensitive perspectives and language</a:t>
+            </a:r>
+          </a:p>
+          <a:p>
+            <a:pPr marL="609585" indent="-304792">
+              <a:spcBef>
+                <a:spcPts val="0"/>
+              </a:spcBef>
+              <a:spcAft>
+                <a:spcPts val="600"/>
+              </a:spcAft>
+            </a:pPr>
+            <a:r>
+              <a:rPr lang="en-US" sz="2000" dirty="0" smtClean="0"/>
+              <a:t>Describing individuals with obesity</a:t>
+            </a:r>
+            <a:endParaRPr lang="en" sz="2000" dirty="0"/>
+          </a:p>
+          <a:p>
+            <a:pPr marL="609585" indent="-304792">
+              <a:spcBef>
+                <a:spcPts val="0"/>
+              </a:spcBef>
+              <a:spcAft>
+                <a:spcPts val="600"/>
+              </a:spcAft>
+            </a:pPr>
+            <a:r>
+              <a:rPr lang="en-US" sz="2000" dirty="0" smtClean="0"/>
+              <a:t>Stigmatizing perspectives</a:t>
+            </a:r>
+            <a:endParaRPr lang="en" sz="2000" dirty="0"/>
+          </a:p>
+          <a:p>
+            <a:pPr>
+              <a:spcBef>
+                <a:spcPts val="0"/>
+              </a:spcBef>
+              <a:spcAft>
+                <a:spcPts val="600"/>
+              </a:spcAft>
+            </a:pPr>
+            <a:r>
+              <a:rPr lang="en" sz="2400" dirty="0"/>
+              <a:t>If we see any issues, we will reach out to you</a:t>
+            </a:r>
+          </a:p>
+          <a:p>
+            <a:pPr>
+              <a:spcBef>
+                <a:spcPts val="0"/>
+              </a:spcBef>
+              <a:spcAft>
+                <a:spcPts val="600"/>
+              </a:spcAft>
+            </a:pPr>
+            <a:r>
+              <a:rPr lang="en" sz="2400" dirty="0"/>
+              <a:t>Please share with us</a:t>
+            </a:r>
+          </a:p>
+          <a:p>
+            <a:pPr>
+              <a:spcBef>
+                <a:spcPts val="0"/>
+              </a:spcBef>
+              <a:spcAft>
+                <a:spcPts val="600"/>
+              </a:spcAft>
               <a:buNone/>
             </a:pPr>
             <a:r>
-              <a:rPr lang="en"/>
-              <a:t>Obesity is hard to talk about.</a:t>
-            </a:r>
+              <a:rPr lang="en" dirty="0"/>
+              <a:t>		</a:t>
+            </a:r>
+          </a:p>
+          <a:p>
+            <a:pPr>
+              <a:spcBef>
+                <a:spcPts val="0"/>
+              </a:spcBef>
+              <a:spcAft>
+                <a:spcPts val="600"/>
+              </a:spcAft>
+              <a:buNone/>
+            </a:pPr>
+            <a:endParaRPr dirty="0"/>
           </a:p>
           <a:p>
             <a:pPr>
@@ -5188,10 +6306,7 @@
               </a:spcBef>
               <a:buNone/>
             </a:pPr>
-            <a:r>
-              <a:rPr lang="en"/>
-              <a:t>Words and perspectives that don’t bother one person, may bother another.</a:t>
-            </a:r>
+            <a:endParaRPr dirty="0"/>
           </a:p>
           <a:p>
             <a:pPr>
@@ -5200,119 +6315,7 @@
               </a:spcBef>
               <a:buNone/>
             </a:pPr>
-            <a:r>
-              <a:rPr lang="en"/>
-              <a:t>We expect everyone in this course to come from a place of empathy and consideration.	</a:t>
-            </a:r>
-          </a:p>
-          <a:p>
-            <a:pPr>
-              <a:spcBef>
-                <a:spcPts val="0"/>
-              </a:spcBef>
-              <a:buNone/>
-            </a:pPr>
-            <a:r>
-              <a:rPr lang="en"/>
-              <a:t>		We won’t all be perfect all the time.</a:t>
-            </a:r>
-          </a:p>
-          <a:p>
-            <a:pPr>
-              <a:spcBef>
-                <a:spcPts val="0"/>
-              </a:spcBef>
-              <a:buNone/>
-            </a:pPr>
-            <a:r>
-              <a:rPr lang="en"/>
-              <a:t>We will try to model for you sensitive perspectives and language</a:t>
-            </a:r>
-          </a:p>
-          <a:p>
-            <a:pPr marL="609585" indent="-304792">
-              <a:spcBef>
-                <a:spcPts val="0"/>
-              </a:spcBef>
-            </a:pPr>
-            <a:r>
-              <a:rPr lang="en"/>
-              <a:t>Person-first language</a:t>
-            </a:r>
-          </a:p>
-          <a:p>
-            <a:pPr marL="609585" indent="-304792">
-              <a:spcBef>
-                <a:spcPts val="0"/>
-              </a:spcBef>
-            </a:pPr>
-            <a:r>
-              <a:rPr lang="en"/>
-              <a:t>Assumptions that being heavier is unwanted</a:t>
-            </a:r>
-          </a:p>
-          <a:p>
-            <a:pPr>
-              <a:spcBef>
-                <a:spcPts val="0"/>
-              </a:spcBef>
-              <a:buNone/>
-            </a:pPr>
-            <a:r>
-              <a:rPr lang="en"/>
-              <a:t>If we see any issues, we will reach out to you</a:t>
-            </a:r>
-          </a:p>
-          <a:p>
-            <a:pPr>
-              <a:spcBef>
-                <a:spcPts val="0"/>
-              </a:spcBef>
-              <a:buNone/>
-            </a:pPr>
-            <a:r>
-              <a:rPr lang="en"/>
-              <a:t>Please share with us</a:t>
-            </a:r>
-          </a:p>
-          <a:p>
-            <a:pPr>
-              <a:spcBef>
-                <a:spcPts val="0"/>
-              </a:spcBef>
-              <a:buNone/>
-            </a:pPr>
-            <a:r>
-              <a:rPr lang="en"/>
-              <a:t>		</a:t>
-            </a:r>
-          </a:p>
-          <a:p>
-            <a:pPr>
-              <a:spcBef>
-                <a:spcPts val="0"/>
-              </a:spcBef>
-              <a:buNone/>
-            </a:pPr>
-            <a:endParaRPr/>
-          </a:p>
-          <a:p>
-            <a:pPr>
-              <a:spcBef>
-                <a:spcPts val="0"/>
-              </a:spcBef>
-              <a:buNone/>
-            </a:pPr>
-            <a:endParaRPr/>
-          </a:p>
-          <a:p>
-            <a:pPr>
-              <a:spcBef>
-                <a:spcPts val="0"/>
-              </a:spcBef>
-              <a:buNone/>
-            </a:pPr>
-            <a:endParaRPr/>
+            <a:endParaRPr dirty="0"/>
           </a:p>
         </p:txBody>
       </p:sp>
@@ -5332,6 +6335,40 @@
 <file path=ppt/slides/slide6.xml><?xml version="1.0" encoding="utf-8"?>
 <p:sld xmlns:a="http://schemas.openxmlformats.org/drawingml/2006/main" xmlns:r="http://schemas.openxmlformats.org/officeDocument/2006/relationships" xmlns:p="http://schemas.openxmlformats.org/presentationml/2006/main">
   <p:cSld>
+    <p:bg>
+      <p:bgPr>
+        <a:gradFill>
+          <a:gsLst>
+            <a:gs pos="0">
+              <a:schemeClr val="accent1">
+                <a:lumMod val="5000"/>
+                <a:lumOff val="95000"/>
+              </a:schemeClr>
+            </a:gs>
+            <a:gs pos="74000">
+              <a:schemeClr val="accent1">
+                <a:lumMod val="45000"/>
+                <a:lumOff val="55000"/>
+              </a:schemeClr>
+            </a:gs>
+            <a:gs pos="83000">
+              <a:schemeClr val="accent1">
+                <a:lumMod val="45000"/>
+                <a:lumOff val="55000"/>
+              </a:schemeClr>
+            </a:gs>
+            <a:gs pos="100000">
+              <a:schemeClr val="accent1">
+                <a:lumMod val="30000"/>
+                <a:lumOff val="70000"/>
+              </a:schemeClr>
+            </a:gs>
+          </a:gsLst>
+          <a:lin ang="5400000" scaled="1"/>
+        </a:gradFill>
+        <a:effectLst/>
+      </p:bgPr>
+    </p:bg>
     <p:spTree>
       <p:nvGrpSpPr>
         <p:cNvPr id="1" name=""/>
@@ -5363,6 +6400,466 @@
           <a:p>
             <a:r>
               <a:rPr lang="en-US" dirty="0" smtClean="0"/>
+              <a:t>Guidelines for class discussions</a:t>
+            </a:r>
+            <a:endParaRPr lang="en-US" dirty="0"/>
+          </a:p>
+        </p:txBody>
+      </p:sp>
+      <p:sp>
+        <p:nvSpPr>
+          <p:cNvPr id="3" name="Content Placeholder 2"/>
+          <p:cNvSpPr>
+            <a:spLocks noGrp="1"/>
+          </p:cNvSpPr>
+          <p:nvPr>
+            <p:ph idx="1"/>
+          </p:nvPr>
+        </p:nvSpPr>
+        <p:spPr>
+          <a:xfrm>
+            <a:off x="2231136" y="2401561"/>
+            <a:ext cx="7729728" cy="3920411"/>
+          </a:xfrm>
+        </p:spPr>
+        <p:txBody>
+          <a:bodyPr>
+            <a:normAutofit/>
+          </a:bodyPr>
+          <a:lstStyle/>
+          <a:p>
+            <a:pPr lvl="0">
+              <a:spcAft>
+                <a:spcPts val="600"/>
+              </a:spcAft>
+            </a:pPr>
+            <a:r>
+              <a:rPr lang="en-US" b="1" dirty="0"/>
+              <a:t>Be aware of how much you are contributing to in-class discussions.</a:t>
+            </a:r>
+            <a:r>
+              <a:rPr lang="en-US" dirty="0"/>
+              <a:t> Try not to silence yourself out of concern for what others will think about what you say. If you have an idea, don’t wait for someone else to say it; say it yourself. If you tend to contribute often, give others the opportunity to speak.</a:t>
+            </a:r>
+          </a:p>
+          <a:p>
+            <a:pPr lvl="0">
+              <a:spcAft>
+                <a:spcPts val="600"/>
+              </a:spcAft>
+            </a:pPr>
+            <a:r>
+              <a:rPr lang="en-US" b="1" dirty="0"/>
+              <a:t>Listen respectfully. </a:t>
+            </a:r>
+            <a:r>
+              <a:rPr lang="en-US" dirty="0"/>
+              <a:t>Don’t interrupt, engage in private conversations, or turn to technology while others are speaking. Use attentive, courteous body language. Comments that you make should reflect that you’ve paid attention to the previous speakers’ contributions.</a:t>
+            </a:r>
+          </a:p>
+          <a:p>
+            <a:pPr lvl="0">
+              <a:spcAft>
+                <a:spcPts val="600"/>
+              </a:spcAft>
+            </a:pPr>
+            <a:r>
+              <a:rPr lang="en-US" b="1" dirty="0"/>
+              <a:t>Take pair work or small group work seriously.</a:t>
+            </a:r>
+            <a:r>
+              <a:rPr lang="en-US" dirty="0"/>
+              <a:t> Remember that your peers’ learning partly depends upon your engagement</a:t>
+            </a:r>
+            <a:r>
+              <a:rPr lang="en-US" dirty="0" smtClean="0"/>
+              <a:t>.</a:t>
+            </a:r>
+            <a:endParaRPr lang="en-US" dirty="0"/>
+          </a:p>
+        </p:txBody>
+      </p:sp>
+    </p:spTree>
+    <p:extLst>
+      <p:ext uri="{BB962C8B-B14F-4D97-AF65-F5344CB8AC3E}">
+        <p14:creationId xmlns:p14="http://schemas.microsoft.com/office/powerpoint/2010/main" val="1279641987"/>
+      </p:ext>
+    </p:extLst>
+  </p:cSld>
+  <p:clrMapOvr>
+    <a:masterClrMapping/>
+  </p:clrMapOvr>
+</p:sld>
+</file>
+
+<file path=ppt/slides/slide7.xml><?xml version="1.0" encoding="utf-8"?>
+<p:sld xmlns:a="http://schemas.openxmlformats.org/drawingml/2006/main" xmlns:r="http://schemas.openxmlformats.org/officeDocument/2006/relationships" xmlns:p="http://schemas.openxmlformats.org/presentationml/2006/main">
+  <p:cSld>
+    <p:bg>
+      <p:bgPr>
+        <a:gradFill>
+          <a:gsLst>
+            <a:gs pos="0">
+              <a:schemeClr val="accent1">
+                <a:lumMod val="5000"/>
+                <a:lumOff val="95000"/>
+              </a:schemeClr>
+            </a:gs>
+            <a:gs pos="74000">
+              <a:schemeClr val="accent1">
+                <a:lumMod val="45000"/>
+                <a:lumOff val="55000"/>
+              </a:schemeClr>
+            </a:gs>
+            <a:gs pos="83000">
+              <a:schemeClr val="accent1">
+                <a:lumMod val="45000"/>
+                <a:lumOff val="55000"/>
+              </a:schemeClr>
+            </a:gs>
+            <a:gs pos="100000">
+              <a:schemeClr val="accent1">
+                <a:lumMod val="30000"/>
+                <a:lumOff val="70000"/>
+              </a:schemeClr>
+            </a:gs>
+          </a:gsLst>
+          <a:lin ang="5400000" scaled="1"/>
+        </a:gradFill>
+        <a:effectLst/>
+      </p:bgPr>
+    </p:bg>
+    <p:spTree>
+      <p:nvGrpSpPr>
+        <p:cNvPr id="1" name=""/>
+        <p:cNvGrpSpPr/>
+        <p:nvPr/>
+      </p:nvGrpSpPr>
+      <p:grpSpPr>
+        <a:xfrm>
+          <a:off x="0" y="0"/>
+          <a:ext cx="0" cy="0"/>
+          <a:chOff x="0" y="0"/>
+          <a:chExt cx="0" cy="0"/>
+        </a:xfrm>
+      </p:grpSpPr>
+      <p:sp>
+        <p:nvSpPr>
+          <p:cNvPr id="2" name="Title 1"/>
+          <p:cNvSpPr>
+            <a:spLocks noGrp="1"/>
+          </p:cNvSpPr>
+          <p:nvPr>
+            <p:ph type="title"/>
+          </p:nvPr>
+        </p:nvSpPr>
+        <p:spPr/>
+        <p:txBody>
+          <a:bodyPr/>
+          <a:lstStyle/>
+          <a:p>
+            <a:r>
+              <a:rPr lang="en-US" dirty="0" smtClean="0"/>
+              <a:t>Guidelines for class discussions</a:t>
+            </a:r>
+            <a:endParaRPr lang="en-US" dirty="0"/>
+          </a:p>
+        </p:txBody>
+      </p:sp>
+      <p:sp>
+        <p:nvSpPr>
+          <p:cNvPr id="3" name="Content Placeholder 2"/>
+          <p:cNvSpPr>
+            <a:spLocks noGrp="1"/>
+          </p:cNvSpPr>
+          <p:nvPr>
+            <p:ph idx="1"/>
+          </p:nvPr>
+        </p:nvSpPr>
+        <p:spPr>
+          <a:xfrm>
+            <a:off x="2231136" y="2370031"/>
+            <a:ext cx="7729728" cy="3841584"/>
+          </a:xfrm>
+        </p:spPr>
+        <p:txBody>
+          <a:bodyPr>
+            <a:normAutofit lnSpcReduction="10000"/>
+          </a:bodyPr>
+          <a:lstStyle/>
+          <a:p>
+            <a:pPr lvl="0">
+              <a:spcAft>
+                <a:spcPts val="600"/>
+              </a:spcAft>
+            </a:pPr>
+            <a:r>
+              <a:rPr lang="en-US" b="1" dirty="0"/>
+              <a:t>Support your statements.</a:t>
+            </a:r>
+            <a:r>
+              <a:rPr lang="en-US" dirty="0"/>
+              <a:t> Use evidence and provide a rationale for your points.</a:t>
+            </a:r>
+          </a:p>
+          <a:p>
+            <a:pPr lvl="0">
+              <a:spcAft>
+                <a:spcPts val="600"/>
+              </a:spcAft>
+            </a:pPr>
+            <a:r>
+              <a:rPr lang="en-US" b="1" dirty="0"/>
+              <a:t>Understand that there are different approaches to solving problems.</a:t>
+            </a:r>
+            <a:r>
+              <a:rPr lang="en-US" dirty="0"/>
+              <a:t> If you are uncertain about someone else’s approach, ask a question to explore areas of uncertainty. Listen respectfully to how and why the approach could work.</a:t>
+            </a:r>
+          </a:p>
+          <a:p>
+            <a:pPr lvl="0">
+              <a:spcAft>
+                <a:spcPts val="600"/>
+              </a:spcAft>
+            </a:pPr>
+            <a:r>
+              <a:rPr lang="en-US" b="1" dirty="0"/>
+              <a:t>Respect others’ right to hold opinions and beliefs that differ from your own.</a:t>
+            </a:r>
+            <a:r>
+              <a:rPr lang="en-US" dirty="0"/>
+              <a:t> Be open to hearing their perspectives. Be open to changing your perspectives based on what you learn from others. Be okay with disagreement. </a:t>
+            </a:r>
+          </a:p>
+          <a:p>
+            <a:pPr lvl="0">
+              <a:spcAft>
+                <a:spcPts val="600"/>
+              </a:spcAft>
+            </a:pPr>
+            <a:r>
+              <a:rPr lang="en-US" b="1" dirty="0"/>
+              <a:t>Make an effort to get to know other students.</a:t>
+            </a:r>
+            <a:r>
+              <a:rPr lang="en-US" dirty="0"/>
+              <a:t> Introduce yourself to students sitting near you. Refer to classmates by name and make eye contact with other students. </a:t>
+            </a:r>
+          </a:p>
+          <a:p>
+            <a:endParaRPr lang="en-US" dirty="0"/>
+          </a:p>
+        </p:txBody>
+      </p:sp>
+    </p:spTree>
+    <p:extLst>
+      <p:ext uri="{BB962C8B-B14F-4D97-AF65-F5344CB8AC3E}">
+        <p14:creationId xmlns:p14="http://schemas.microsoft.com/office/powerpoint/2010/main" val="701099612"/>
+      </p:ext>
+    </p:extLst>
+  </p:cSld>
+  <p:clrMapOvr>
+    <a:masterClrMapping/>
+  </p:clrMapOvr>
+  <p:timing>
+    <p:tnLst>
+      <p:par>
+        <p:cTn id="1" dur="indefinite" restart="never" nodeType="tmRoot"/>
+      </p:par>
+    </p:tnLst>
+  </p:timing>
+</p:sld>
+</file>
+
+<file path=ppt/slides/slide8.xml><?xml version="1.0" encoding="utf-8"?>
+<p:sld xmlns:a="http://schemas.openxmlformats.org/drawingml/2006/main" xmlns:r="http://schemas.openxmlformats.org/officeDocument/2006/relationships" xmlns:p="http://schemas.openxmlformats.org/presentationml/2006/main">
+  <p:cSld>
+    <p:bg>
+      <p:bgPr>
+        <a:gradFill>
+          <a:gsLst>
+            <a:gs pos="0">
+              <a:schemeClr val="accent1">
+                <a:lumMod val="5000"/>
+                <a:lumOff val="95000"/>
+              </a:schemeClr>
+            </a:gs>
+            <a:gs pos="74000">
+              <a:schemeClr val="accent1">
+                <a:lumMod val="45000"/>
+                <a:lumOff val="55000"/>
+              </a:schemeClr>
+            </a:gs>
+            <a:gs pos="83000">
+              <a:schemeClr val="accent1">
+                <a:lumMod val="45000"/>
+                <a:lumOff val="55000"/>
+              </a:schemeClr>
+            </a:gs>
+            <a:gs pos="100000">
+              <a:schemeClr val="accent1">
+                <a:lumMod val="30000"/>
+                <a:lumOff val="70000"/>
+              </a:schemeClr>
+            </a:gs>
+          </a:gsLst>
+          <a:lin ang="5400000" scaled="1"/>
+        </a:gradFill>
+        <a:effectLst/>
+      </p:bgPr>
+    </p:bg>
+    <p:spTree>
+      <p:nvGrpSpPr>
+        <p:cNvPr id="1" name=""/>
+        <p:cNvGrpSpPr/>
+        <p:nvPr/>
+      </p:nvGrpSpPr>
+      <p:grpSpPr>
+        <a:xfrm>
+          <a:off x="0" y="0"/>
+          <a:ext cx="0" cy="0"/>
+          <a:chOff x="0" y="0"/>
+          <a:chExt cx="0" cy="0"/>
+        </a:xfrm>
+      </p:grpSpPr>
+      <p:sp>
+        <p:nvSpPr>
+          <p:cNvPr id="2" name="Title 1"/>
+          <p:cNvSpPr>
+            <a:spLocks noGrp="1"/>
+          </p:cNvSpPr>
+          <p:nvPr>
+            <p:ph type="title"/>
+          </p:nvPr>
+        </p:nvSpPr>
+        <p:spPr/>
+        <p:txBody>
+          <a:bodyPr/>
+          <a:lstStyle/>
+          <a:p>
+            <a:r>
+              <a:rPr lang="en-US" dirty="0" smtClean="0"/>
+              <a:t>Lessons learned about effective engagement</a:t>
+            </a:r>
+            <a:endParaRPr lang="en-US" dirty="0"/>
+          </a:p>
+        </p:txBody>
+      </p:sp>
+      <p:sp>
+        <p:nvSpPr>
+          <p:cNvPr id="3" name="Content Placeholder 2"/>
+          <p:cNvSpPr>
+            <a:spLocks noGrp="1"/>
+          </p:cNvSpPr>
+          <p:nvPr>
+            <p:ph idx="1"/>
+          </p:nvPr>
+        </p:nvSpPr>
+        <p:spPr/>
+        <p:txBody>
+          <a:bodyPr/>
+          <a:lstStyle/>
+          <a:p>
+            <a:r>
+              <a:rPr lang="en-US" dirty="0" smtClean="0"/>
+              <a:t>Discussions are helpful</a:t>
+            </a:r>
+          </a:p>
+          <a:p>
+            <a:pPr lvl="1"/>
+            <a:r>
+              <a:rPr lang="en-US" dirty="0" smtClean="0"/>
+              <a:t>Not helpful to have students lead discussions</a:t>
+            </a:r>
+          </a:p>
+          <a:p>
+            <a:pPr lvl="1"/>
+            <a:r>
+              <a:rPr lang="en-US" dirty="0" smtClean="0"/>
+              <a:t>Helpful to have students lead with structured questions</a:t>
+            </a:r>
+          </a:p>
+          <a:p>
+            <a:pPr lvl="1"/>
+            <a:r>
+              <a:rPr lang="en-US" dirty="0" smtClean="0"/>
+              <a:t>Helpful to be able to teach others about concepts</a:t>
+            </a:r>
+          </a:p>
+          <a:p>
+            <a:r>
+              <a:rPr lang="en-US" dirty="0" smtClean="0"/>
+              <a:t>Discussions on topics like race and gender are difficult, but worthwhile</a:t>
+            </a:r>
+          </a:p>
+          <a:p>
+            <a:r>
+              <a:rPr lang="en-US" dirty="0" smtClean="0"/>
+              <a:t>Discussions about concepts that people can have varying subjective viewpoints on are useful </a:t>
+            </a:r>
+            <a:r>
+              <a:rPr lang="en-US" smtClean="0"/>
+              <a:t>and interesting</a:t>
+            </a:r>
+            <a:endParaRPr lang="en-US" dirty="0"/>
+          </a:p>
+        </p:txBody>
+      </p:sp>
+    </p:spTree>
+    <p:extLst>
+      <p:ext uri="{BB962C8B-B14F-4D97-AF65-F5344CB8AC3E}">
+        <p14:creationId xmlns:p14="http://schemas.microsoft.com/office/powerpoint/2010/main" val="1466782939"/>
+      </p:ext>
+    </p:extLst>
+  </p:cSld>
+  <p:clrMapOvr>
+    <a:masterClrMapping/>
+  </p:clrMapOvr>
+  <p:timing>
+    <p:tnLst>
+      <p:par>
+        <p:cTn id="1" dur="indefinite" restart="never" nodeType="tmRoot"/>
+      </p:par>
+    </p:tnLst>
+  </p:timing>
+</p:sld>
+</file>
+
+<file path=ppt/slides/slide9.xml><?xml version="1.0" encoding="utf-8"?>
+<p:sld xmlns:a="http://schemas.openxmlformats.org/drawingml/2006/main" xmlns:r="http://schemas.openxmlformats.org/officeDocument/2006/relationships" xmlns:p="http://schemas.openxmlformats.org/presentationml/2006/main">
+  <p:cSld>
+    <p:spTree>
+      <p:nvGrpSpPr>
+        <p:cNvPr id="1" name=""/>
+        <p:cNvGrpSpPr/>
+        <p:nvPr/>
+      </p:nvGrpSpPr>
+      <p:grpSpPr>
+        <a:xfrm>
+          <a:off x="0" y="0"/>
+          <a:ext cx="0" cy="0"/>
+          <a:chOff x="0" y="0"/>
+          <a:chExt cx="0" cy="0"/>
+        </a:xfrm>
+      </p:grpSpPr>
+      <p:sp>
+        <p:nvSpPr>
+          <p:cNvPr id="2" name="Title 1"/>
+          <p:cNvSpPr>
+            <a:spLocks noGrp="1"/>
+          </p:cNvSpPr>
+          <p:nvPr>
+            <p:ph type="title"/>
+          </p:nvPr>
+        </p:nvSpPr>
+        <p:spPr/>
+        <p:txBody>
+          <a:bodyPr/>
+          <a:lstStyle/>
+          <a:p>
+            <a:r>
+              <a:rPr lang="en-US" dirty="0" smtClean="0"/>
               <a:t>This Course</a:t>
             </a:r>
             <a:endParaRPr lang="en-US" dirty="0"/>
@@ -5381,35 +6878,37 @@
         </p:nvSpPr>
         <p:spPr/>
         <p:txBody>
-          <a:bodyPr/>
-          <a:lstStyle/>
-          <a:p>
-            <a:r>
-              <a:rPr lang="en-US" dirty="0" smtClean="0"/>
+          <a:bodyPr>
+            <a:normAutofit/>
+          </a:bodyPr>
+          <a:lstStyle/>
+          <a:p>
+            <a:r>
+              <a:rPr lang="en-US" sz="2800" dirty="0" smtClean="0"/>
               <a:t>Three main topics</a:t>
             </a:r>
           </a:p>
           <a:p>
             <a:pPr lvl="1"/>
             <a:r>
-              <a:rPr lang="en-US" dirty="0" smtClean="0"/>
+              <a:rPr lang="en-US" sz="2400" dirty="0" smtClean="0"/>
               <a:t>Causes and trends in obesity</a:t>
             </a:r>
           </a:p>
           <a:p>
             <a:pPr lvl="1"/>
             <a:r>
-              <a:rPr lang="en-US" dirty="0" smtClean="0"/>
+              <a:rPr lang="en-US" sz="2400" dirty="0" smtClean="0"/>
               <a:t>Related chronic health outcomes</a:t>
             </a:r>
           </a:p>
           <a:p>
             <a:pPr lvl="1"/>
             <a:r>
-              <a:rPr lang="en-US" dirty="0" smtClean="0"/>
+              <a:rPr lang="en-US" sz="2400" dirty="0" smtClean="0"/>
               <a:t>Interventions and policy approaches</a:t>
             </a:r>
-            <a:endParaRPr lang="en-US" dirty="0"/>
+            <a:endParaRPr lang="en-US" sz="2400" dirty="0"/>
           </a:p>
         </p:txBody>
       </p:sp>
@@ -5699,619 +7198,6 @@
     <p:bldLst>
       <p:bldP spid="3" grpId="0" build="p" bldLvl="2"/>
     </p:bldLst>
-  </p:timing>
-</p:sld>
-</file>
-
-<file path=ppt/slides/slide7.xml><?xml version="1.0" encoding="utf-8"?>
-<p:sld xmlns:a="http://schemas.openxmlformats.org/drawingml/2006/main" xmlns:r="http://schemas.openxmlformats.org/officeDocument/2006/relationships" xmlns:p="http://schemas.openxmlformats.org/presentationml/2006/main">
-  <p:cSld>
-    <p:spTree>
-      <p:nvGrpSpPr>
-        <p:cNvPr id="1" name=""/>
-        <p:cNvGrpSpPr/>
-        <p:nvPr/>
-      </p:nvGrpSpPr>
-      <p:grpSpPr>
-        <a:xfrm>
-          <a:off x="0" y="0"/>
-          <a:ext cx="0" cy="0"/>
-          <a:chOff x="0" y="0"/>
-          <a:chExt cx="0" cy="0"/>
-        </a:xfrm>
-      </p:grpSpPr>
-      <p:sp>
-        <p:nvSpPr>
-          <p:cNvPr id="2" name="Title 1"/>
-          <p:cNvSpPr>
-            <a:spLocks noGrp="1"/>
-          </p:cNvSpPr>
-          <p:nvPr>
-            <p:ph type="title"/>
-          </p:nvPr>
-        </p:nvSpPr>
-        <p:spPr/>
-        <p:txBody>
-          <a:bodyPr/>
-          <a:lstStyle/>
-          <a:p>
-            <a:r>
-              <a:rPr lang="en-US" dirty="0" smtClean="0"/>
-              <a:t>Class Rules</a:t>
-            </a:r>
-            <a:endParaRPr lang="en-US" dirty="0"/>
-          </a:p>
-        </p:txBody>
-      </p:sp>
-      <p:sp>
-        <p:nvSpPr>
-          <p:cNvPr id="3" name="Content Placeholder 2"/>
-          <p:cNvSpPr>
-            <a:spLocks noGrp="1"/>
-          </p:cNvSpPr>
-          <p:nvPr>
-            <p:ph idx="1"/>
-          </p:nvPr>
-        </p:nvSpPr>
-        <p:spPr/>
-        <p:txBody>
-          <a:bodyPr/>
-          <a:lstStyle/>
-          <a:p>
-            <a:r>
-              <a:rPr lang="en-US" dirty="0" smtClean="0"/>
-              <a:t>No laptops, phones, tablets, </a:t>
-            </a:r>
-            <a:r>
-              <a:rPr lang="en-US" dirty="0" err="1" smtClean="0"/>
-              <a:t>etc</a:t>
-            </a:r>
-            <a:endParaRPr lang="en-US" dirty="0" smtClean="0"/>
-          </a:p>
-          <a:p>
-            <a:r>
-              <a:rPr lang="en-US" dirty="0" smtClean="0"/>
-              <a:t>We will provide slides beforehand</a:t>
-            </a:r>
-          </a:p>
-          <a:p>
-            <a:r>
-              <a:rPr lang="en-US" dirty="0" smtClean="0"/>
-              <a:t>Purchase and register an </a:t>
-            </a:r>
-            <a:r>
-              <a:rPr lang="en-US" dirty="0" err="1" smtClean="0"/>
-              <a:t>iClicker</a:t>
-            </a:r>
-            <a:endParaRPr lang="en-US" dirty="0" smtClean="0"/>
-          </a:p>
-          <a:p>
-            <a:pPr lvl="1"/>
-            <a:r>
-              <a:rPr lang="en-US" dirty="0" smtClean="0"/>
-              <a:t>This will be used for participation purposes but </a:t>
-            </a:r>
-            <a:r>
-              <a:rPr lang="en-US" b="1" u="sng" dirty="0" smtClean="0"/>
-              <a:t>not</a:t>
-            </a:r>
-            <a:r>
-              <a:rPr lang="en-US" b="1" dirty="0" smtClean="0"/>
-              <a:t> </a:t>
-            </a:r>
-            <a:r>
-              <a:rPr lang="en-US" dirty="0" smtClean="0"/>
-              <a:t>for grading</a:t>
-            </a:r>
-            <a:endParaRPr lang="en-US" dirty="0"/>
-          </a:p>
-        </p:txBody>
-      </p:sp>
-    </p:spTree>
-    <p:extLst>
-      <p:ext uri="{BB962C8B-B14F-4D97-AF65-F5344CB8AC3E}">
-        <p14:creationId xmlns:p14="http://schemas.microsoft.com/office/powerpoint/2010/main" val="30086143"/>
-      </p:ext>
-    </p:extLst>
-  </p:cSld>
-  <p:clrMapOvr>
-    <a:masterClrMapping/>
-  </p:clrMapOvr>
-  <p:timing>
-    <p:tnLst>
-      <p:par>
-        <p:cTn id="1" dur="indefinite" restart="never" nodeType="tmRoot">
-          <p:childTnLst>
-            <p:seq concurrent="1" nextAc="seek">
-              <p:cTn id="2" dur="indefinite" nodeType="mainSeq">
-                <p:childTnLst>
-                  <p:par>
-                    <p:cTn id="3" fill="hold">
-                      <p:stCondLst>
-                        <p:cond delay="indefinite"/>
-                      </p:stCondLst>
-                      <p:childTnLst>
-                        <p:par>
-                          <p:cTn id="4" fill="hold">
-                            <p:stCondLst>
-                              <p:cond delay="0"/>
-                            </p:stCondLst>
-                            <p:childTnLst>
-                              <p:par>
-                                <p:cTn id="5" presetID="3" presetClass="entr" presetSubtype="10" fill="hold" grpId="0" nodeType="clickEffect">
-                                  <p:stCondLst>
-                                    <p:cond delay="0"/>
-                                  </p:stCondLst>
-                                  <p:childTnLst>
-                                    <p:set>
-                                      <p:cBhvr>
-                                        <p:cTn id="6" dur="1" fill="hold">
-                                          <p:stCondLst>
-                                            <p:cond delay="0"/>
-                                          </p:stCondLst>
-                                        </p:cTn>
-                                        <p:tgtEl>
-                                          <p:spTgt spid="3">
-                                            <p:txEl>
-                                              <p:pRg st="0" end="0"/>
-                                            </p:txEl>
-                                          </p:spTgt>
-                                        </p:tgtEl>
-                                        <p:attrNameLst>
-                                          <p:attrName>style.visibility</p:attrName>
-                                        </p:attrNameLst>
-                                      </p:cBhvr>
-                                      <p:to>
-                                        <p:strVal val="visible"/>
-                                      </p:to>
-                                    </p:set>
-                                    <p:animEffect transition="in" filter="blinds(horizontal)">
-                                      <p:cBhvr>
-                                        <p:cTn id="7" dur="500"/>
-                                        <p:tgtEl>
-                                          <p:spTgt spid="3">
-                                            <p:txEl>
-                                              <p:pRg st="0" end="0"/>
-                                            </p:txEl>
-                                          </p:spTgt>
-                                        </p:tgtEl>
-                                      </p:cBhvr>
-                                    </p:animEffect>
-                                  </p:childTnLst>
-                                </p:cTn>
-                              </p:par>
-                            </p:childTnLst>
-                          </p:cTn>
-                        </p:par>
-                      </p:childTnLst>
-                    </p:cTn>
-                  </p:par>
-                  <p:par>
-                    <p:cTn id="8" fill="hold">
-                      <p:stCondLst>
-                        <p:cond delay="indefinite"/>
-                      </p:stCondLst>
-                      <p:childTnLst>
-                        <p:par>
-                          <p:cTn id="9" fill="hold">
-                            <p:stCondLst>
-                              <p:cond delay="0"/>
-                            </p:stCondLst>
-                            <p:childTnLst>
-                              <p:par>
-                                <p:cTn id="10" presetID="3" presetClass="entr" presetSubtype="10" fill="hold" grpId="0" nodeType="clickEffect">
-                                  <p:stCondLst>
-                                    <p:cond delay="0"/>
-                                  </p:stCondLst>
-                                  <p:childTnLst>
-                                    <p:set>
-                                      <p:cBhvr>
-                                        <p:cTn id="11" dur="1" fill="hold">
-                                          <p:stCondLst>
-                                            <p:cond delay="0"/>
-                                          </p:stCondLst>
-                                        </p:cTn>
-                                        <p:tgtEl>
-                                          <p:spTgt spid="3">
-                                            <p:txEl>
-                                              <p:pRg st="1" end="1"/>
-                                            </p:txEl>
-                                          </p:spTgt>
-                                        </p:tgtEl>
-                                        <p:attrNameLst>
-                                          <p:attrName>style.visibility</p:attrName>
-                                        </p:attrNameLst>
-                                      </p:cBhvr>
-                                      <p:to>
-                                        <p:strVal val="visible"/>
-                                      </p:to>
-                                    </p:set>
-                                    <p:animEffect transition="in" filter="blinds(horizontal)">
-                                      <p:cBhvr>
-                                        <p:cTn id="12" dur="500"/>
-                                        <p:tgtEl>
-                                          <p:spTgt spid="3">
-                                            <p:txEl>
-                                              <p:pRg st="1" end="1"/>
-                                            </p:txEl>
-                                          </p:spTgt>
-                                        </p:tgtEl>
-                                      </p:cBhvr>
-                                    </p:animEffect>
-                                  </p:childTnLst>
-                                </p:cTn>
-                              </p:par>
-                            </p:childTnLst>
-                          </p:cTn>
-                        </p:par>
-                      </p:childTnLst>
-                    </p:cTn>
-                  </p:par>
-                  <p:par>
-                    <p:cTn id="13" fill="hold">
-                      <p:stCondLst>
-                        <p:cond delay="indefinite"/>
-                      </p:stCondLst>
-                      <p:childTnLst>
-                        <p:par>
-                          <p:cTn id="14" fill="hold">
-                            <p:stCondLst>
-                              <p:cond delay="0"/>
-                            </p:stCondLst>
-                            <p:childTnLst>
-                              <p:par>
-                                <p:cTn id="15" presetID="3" presetClass="entr" presetSubtype="10" fill="hold" grpId="0" nodeType="clickEffect">
-                                  <p:stCondLst>
-                                    <p:cond delay="0"/>
-                                  </p:stCondLst>
-                                  <p:childTnLst>
-                                    <p:set>
-                                      <p:cBhvr>
-                                        <p:cTn id="16" dur="1" fill="hold">
-                                          <p:stCondLst>
-                                            <p:cond delay="0"/>
-                                          </p:stCondLst>
-                                        </p:cTn>
-                                        <p:tgtEl>
-                                          <p:spTgt spid="3">
-                                            <p:txEl>
-                                              <p:pRg st="2" end="2"/>
-                                            </p:txEl>
-                                          </p:spTgt>
-                                        </p:tgtEl>
-                                        <p:attrNameLst>
-                                          <p:attrName>style.visibility</p:attrName>
-                                        </p:attrNameLst>
-                                      </p:cBhvr>
-                                      <p:to>
-                                        <p:strVal val="visible"/>
-                                      </p:to>
-                                    </p:set>
-                                    <p:animEffect transition="in" filter="blinds(horizontal)">
-                                      <p:cBhvr>
-                                        <p:cTn id="17" dur="500"/>
-                                        <p:tgtEl>
-                                          <p:spTgt spid="3">
-                                            <p:txEl>
-                                              <p:pRg st="2" end="2"/>
-                                            </p:txEl>
-                                          </p:spTgt>
-                                        </p:tgtEl>
-                                      </p:cBhvr>
-                                    </p:animEffect>
-                                  </p:childTnLst>
-                                </p:cTn>
-                              </p:par>
-                              <p:par>
-                                <p:cTn id="18" presetID="3" presetClass="entr" presetSubtype="10" fill="hold" grpId="0" nodeType="withEffect">
-                                  <p:stCondLst>
-                                    <p:cond delay="0"/>
-                                  </p:stCondLst>
-                                  <p:childTnLst>
-                                    <p:set>
-                                      <p:cBhvr>
-                                        <p:cTn id="19" dur="1" fill="hold">
-                                          <p:stCondLst>
-                                            <p:cond delay="0"/>
-                                          </p:stCondLst>
-                                        </p:cTn>
-                                        <p:tgtEl>
-                                          <p:spTgt spid="3">
-                                            <p:txEl>
-                                              <p:pRg st="3" end="3"/>
-                                            </p:txEl>
-                                          </p:spTgt>
-                                        </p:tgtEl>
-                                        <p:attrNameLst>
-                                          <p:attrName>style.visibility</p:attrName>
-                                        </p:attrNameLst>
-                                      </p:cBhvr>
-                                      <p:to>
-                                        <p:strVal val="visible"/>
-                                      </p:to>
-                                    </p:set>
-                                    <p:animEffect transition="in" filter="blinds(horizontal)">
-                                      <p:cBhvr>
-                                        <p:cTn id="20" dur="500"/>
-                                        <p:tgtEl>
-                                          <p:spTgt spid="3">
-                                            <p:txEl>
-                                              <p:pRg st="3" end="3"/>
-                                            </p:txEl>
-                                          </p:spTgt>
-                                        </p:tgtEl>
-                                      </p:cBhvr>
-                                    </p:animEffect>
-                                  </p:childTnLst>
-                                </p:cTn>
-                              </p:par>
-                            </p:childTnLst>
-                          </p:cTn>
-                        </p:par>
-                      </p:childTnLst>
-                    </p:cTn>
-                  </p:par>
-                </p:childTnLst>
-              </p:cTn>
-              <p:prevCondLst>
-                <p:cond evt="onPrev" delay="0">
-                  <p:tgtEl>
-                    <p:sldTgt/>
-                  </p:tgtEl>
-                </p:cond>
-              </p:prevCondLst>
-              <p:nextCondLst>
-                <p:cond evt="onNext" delay="0">
-                  <p:tgtEl>
-                    <p:sldTgt/>
-                  </p:tgtEl>
-                </p:cond>
-              </p:nextCondLst>
-            </p:seq>
-          </p:childTnLst>
-        </p:cTn>
-      </p:par>
-    </p:tnLst>
-    <p:bldLst>
-      <p:bldP spid="3" grpId="0" build="p"/>
-    </p:bldLst>
-  </p:timing>
-</p:sld>
-</file>
-
-<file path=ppt/slides/slide8.xml><?xml version="1.0" encoding="utf-8"?>
-<p:sld xmlns:a="http://schemas.openxmlformats.org/drawingml/2006/main" xmlns:r="http://schemas.openxmlformats.org/officeDocument/2006/relationships" xmlns:p="http://schemas.openxmlformats.org/presentationml/2006/main">
-  <p:cSld>
-    <p:spTree>
-      <p:nvGrpSpPr>
-        <p:cNvPr id="1" name=""/>
-        <p:cNvGrpSpPr/>
-        <p:nvPr/>
-      </p:nvGrpSpPr>
-      <p:grpSpPr>
-        <a:xfrm>
-          <a:off x="0" y="0"/>
-          <a:ext cx="0" cy="0"/>
-          <a:chOff x="0" y="0"/>
-          <a:chExt cx="0" cy="0"/>
-        </a:xfrm>
-      </p:grpSpPr>
-      <p:sp>
-        <p:nvSpPr>
-          <p:cNvPr id="2" name="Title 1"/>
-          <p:cNvSpPr>
-            <a:spLocks noGrp="1"/>
-          </p:cNvSpPr>
-          <p:nvPr>
-            <p:ph type="title"/>
-          </p:nvPr>
-        </p:nvSpPr>
-        <p:spPr/>
-        <p:txBody>
-          <a:bodyPr/>
-          <a:lstStyle/>
-          <a:p>
-            <a:r>
-              <a:rPr lang="en-US" dirty="0" smtClean="0"/>
-              <a:t>What is the best hockey team in the world?</a:t>
-            </a:r>
-            <a:endParaRPr lang="en-US" dirty="0"/>
-          </a:p>
-        </p:txBody>
-      </p:sp>
-      <p:sp>
-        <p:nvSpPr>
-          <p:cNvPr id="3" name="Content Placeholder 2"/>
-          <p:cNvSpPr>
-            <a:spLocks noGrp="1"/>
-          </p:cNvSpPr>
-          <p:nvPr>
-            <p:ph idx="1"/>
-          </p:nvPr>
-        </p:nvSpPr>
-        <p:spPr/>
-        <p:txBody>
-          <a:bodyPr/>
-          <a:lstStyle/>
-          <a:p>
-            <a:pPr marL="342900" indent="-342900">
-              <a:buFont typeface="+mj-lt"/>
-              <a:buAutoNum type="alphaUcPeriod"/>
-            </a:pPr>
-            <a:r>
-              <a:rPr lang="en-US" dirty="0" smtClean="0"/>
-              <a:t>Detroit Red Wings</a:t>
-            </a:r>
-          </a:p>
-          <a:p>
-            <a:pPr marL="342900" indent="-342900">
-              <a:buFont typeface="+mj-lt"/>
-              <a:buAutoNum type="alphaUcPeriod"/>
-            </a:pPr>
-            <a:r>
-              <a:rPr lang="en-US" dirty="0" smtClean="0"/>
-              <a:t>Toronto Maple Leafs</a:t>
-            </a:r>
-          </a:p>
-          <a:p>
-            <a:pPr marL="342900" indent="-342900">
-              <a:buFont typeface="+mj-lt"/>
-              <a:buAutoNum type="alphaUcPeriod"/>
-            </a:pPr>
-            <a:r>
-              <a:rPr lang="en-US" dirty="0" smtClean="0"/>
-              <a:t>Montreal </a:t>
-            </a:r>
-            <a:r>
-              <a:rPr lang="en-US" dirty="0" err="1" smtClean="0"/>
-              <a:t>Canadiens</a:t>
-            </a:r>
-            <a:endParaRPr lang="en-US" dirty="0" smtClean="0"/>
-          </a:p>
-          <a:p>
-            <a:pPr marL="342900" indent="-342900">
-              <a:buFont typeface="+mj-lt"/>
-              <a:buAutoNum type="alphaUcPeriod"/>
-            </a:pPr>
-            <a:r>
-              <a:rPr lang="en-US" dirty="0" smtClean="0"/>
-              <a:t>Pittsburgh Penguins</a:t>
-            </a:r>
-            <a:endParaRPr lang="en-US" dirty="0"/>
-          </a:p>
-        </p:txBody>
-      </p:sp>
-    </p:spTree>
-    <p:extLst>
-      <p:ext uri="{BB962C8B-B14F-4D97-AF65-F5344CB8AC3E}">
-        <p14:creationId xmlns:p14="http://schemas.microsoft.com/office/powerpoint/2010/main" val="1087297385"/>
-      </p:ext>
-    </p:extLst>
-  </p:cSld>
-  <p:clrMapOvr>
-    <a:masterClrMapping/>
-  </p:clrMapOvr>
-  <p:timing>
-    <p:tnLst>
-      <p:par>
-        <p:cTn id="1" dur="indefinite" restart="never" nodeType="tmRoot"/>
-      </p:par>
-    </p:tnLst>
-  </p:timing>
-</p:sld>
-</file>
-
-<file path=ppt/slides/slide9.xml><?xml version="1.0" encoding="utf-8"?>
-<p:sld xmlns:a="http://schemas.openxmlformats.org/drawingml/2006/main" xmlns:r="http://schemas.openxmlformats.org/officeDocument/2006/relationships" xmlns:p="http://schemas.openxmlformats.org/presentationml/2006/main">
-  <p:cSld>
-    <p:spTree>
-      <p:nvGrpSpPr>
-        <p:cNvPr id="1" name=""/>
-        <p:cNvGrpSpPr/>
-        <p:nvPr/>
-      </p:nvGrpSpPr>
-      <p:grpSpPr>
-        <a:xfrm>
-          <a:off x="0" y="0"/>
-          <a:ext cx="0" cy="0"/>
-          <a:chOff x="0" y="0"/>
-          <a:chExt cx="0" cy="0"/>
-        </a:xfrm>
-      </p:grpSpPr>
-      <p:sp>
-        <p:nvSpPr>
-          <p:cNvPr id="2" name="Title 1"/>
-          <p:cNvSpPr>
-            <a:spLocks noGrp="1"/>
-          </p:cNvSpPr>
-          <p:nvPr>
-            <p:ph type="title"/>
-          </p:nvPr>
-        </p:nvSpPr>
-        <p:spPr/>
-        <p:txBody>
-          <a:bodyPr/>
-          <a:lstStyle/>
-          <a:p>
-            <a:r>
-              <a:rPr lang="en-US" dirty="0" smtClean="0"/>
-              <a:t>Class Format</a:t>
-            </a:r>
-            <a:endParaRPr lang="en-US" dirty="0"/>
-          </a:p>
-        </p:txBody>
-      </p:sp>
-      <p:sp>
-        <p:nvSpPr>
-          <p:cNvPr id="3" name="Content Placeholder 2"/>
-          <p:cNvSpPr>
-            <a:spLocks noGrp="1"/>
-          </p:cNvSpPr>
-          <p:nvPr>
-            <p:ph idx="1"/>
-          </p:nvPr>
-        </p:nvSpPr>
-        <p:spPr/>
-        <p:txBody>
-          <a:bodyPr/>
-          <a:lstStyle/>
-          <a:p>
-            <a:r>
-              <a:rPr lang="en-US" dirty="0" smtClean="0"/>
-              <a:t>2 Lectures per week, often one by me and one by Dr. Bauer</a:t>
-            </a:r>
-          </a:p>
-          <a:p>
-            <a:r>
-              <a:rPr lang="en-US" dirty="0" smtClean="0"/>
-              <a:t>1 Discussion section per week</a:t>
-            </a:r>
-          </a:p>
-          <a:p>
-            <a:pPr lvl="1"/>
-            <a:r>
-              <a:rPr lang="en-US" dirty="0" smtClean="0"/>
-              <a:t>This week’s discussion section will be a demonstration of body composition assessment</a:t>
-            </a:r>
-          </a:p>
-          <a:p>
-            <a:pPr lvl="1"/>
-            <a:r>
-              <a:rPr lang="en-US" dirty="0" smtClean="0"/>
-              <a:t>Readings are posted, read them </a:t>
-            </a:r>
-            <a:r>
-              <a:rPr lang="en-US" b="1" u="sng" dirty="0" smtClean="0"/>
-              <a:t>before</a:t>
-            </a:r>
-            <a:r>
-              <a:rPr lang="en-US" b="1" dirty="0" smtClean="0"/>
-              <a:t> </a:t>
-            </a:r>
-            <a:r>
-              <a:rPr lang="en-US" dirty="0" smtClean="0"/>
-              <a:t>the discussion</a:t>
-            </a:r>
-            <a:endParaRPr lang="en-US" dirty="0"/>
-          </a:p>
-        </p:txBody>
-      </p:sp>
-    </p:spTree>
-    <p:extLst>
-      <p:ext uri="{BB962C8B-B14F-4D97-AF65-F5344CB8AC3E}">
-        <p14:creationId xmlns:p14="http://schemas.microsoft.com/office/powerpoint/2010/main" val="2084624364"/>
-      </p:ext>
-    </p:extLst>
-  </p:cSld>
-  <p:clrMapOvr>
-    <a:masterClrMapping/>
-  </p:clrMapOvr>
-  <p:timing>
-    <p:tnLst>
-      <p:par>
-        <p:cTn id="1" dur="indefinite" restart="never" nodeType="tmRoot"/>
-      </p:par>
-    </p:tnLst>
   </p:timing>
 </p:sld>
 </file>

</xml_diff>